<commit_message>
Added QUnit files and Master Story list and diary to keep track of experience on project
</commit_message>
<xml_diff>
--- a/documents/InceptionDeck.pptx
+++ b/documents/InceptionDeck.pptx
@@ -318,7 +318,7 @@
           <a:p>
             <a:fld id="{46E2107D-D319-5F4F-8A99-2F4ABC4ACCF5}" type="datetimeFigureOut">
               <a:rPr lang="en-US" smtClean="0"/>
-              <a:t>6/9/14</a:t>
+              <a:t>6/10/14</a:t>
             </a:fld>
             <a:endParaRPr lang="en-US"/>
           </a:p>
@@ -772,7 +772,7 @@
           <a:p>
             <a:fld id="{46E2107D-D319-5F4F-8A99-2F4ABC4ACCF5}" type="datetimeFigureOut">
               <a:rPr lang="en-US" smtClean="0"/>
-              <a:t>6/9/14</a:t>
+              <a:t>6/10/14</a:t>
             </a:fld>
             <a:endParaRPr lang="en-US"/>
           </a:p>
@@ -1315,7 +1315,7 @@
           <a:p>
             <a:fld id="{46E2107D-D319-5F4F-8A99-2F4ABC4ACCF5}" type="datetimeFigureOut">
               <a:rPr lang="en-US" smtClean="0"/>
-              <a:t>6/9/14</a:t>
+              <a:t>6/10/14</a:t>
             </a:fld>
             <a:endParaRPr lang="en-US"/>
           </a:p>
@@ -1451,7 +1451,7 @@
           <a:p>
             <a:fld id="{46E2107D-D319-5F4F-8A99-2F4ABC4ACCF5}" type="datetimeFigureOut">
               <a:rPr lang="en-US" smtClean="0"/>
-              <a:t>6/9/14</a:t>
+              <a:t>6/10/14</a:t>
             </a:fld>
             <a:endParaRPr lang="en-US"/>
           </a:p>
@@ -1789,7 +1789,7 @@
           <a:p>
             <a:fld id="{46E2107D-D319-5F4F-8A99-2F4ABC4ACCF5}" type="datetimeFigureOut">
               <a:rPr lang="en-US" smtClean="0"/>
-              <a:t>6/9/14</a:t>
+              <a:t>6/10/14</a:t>
             </a:fld>
             <a:endParaRPr lang="en-US"/>
           </a:p>
@@ -2115,7 +2115,7 @@
           <a:p>
             <a:fld id="{46E2107D-D319-5F4F-8A99-2F4ABC4ACCF5}" type="datetimeFigureOut">
               <a:rPr lang="en-US" smtClean="0"/>
-              <a:t>6/9/14</a:t>
+              <a:t>6/10/14</a:t>
             </a:fld>
             <a:endParaRPr lang="en-US"/>
           </a:p>
@@ -2413,7 +2413,7 @@
           <a:p>
             <a:fld id="{46E2107D-D319-5F4F-8A99-2F4ABC4ACCF5}" type="datetimeFigureOut">
               <a:rPr lang="en-US" smtClean="0"/>
-              <a:t>6/9/14</a:t>
+              <a:t>6/10/14</a:t>
             </a:fld>
             <a:endParaRPr lang="en-US"/>
           </a:p>
@@ -2800,7 +2800,7 @@
           <a:p>
             <a:fld id="{46E2107D-D319-5F4F-8A99-2F4ABC4ACCF5}" type="datetimeFigureOut">
               <a:rPr lang="en-US" smtClean="0"/>
-              <a:t>6/9/14</a:t>
+              <a:t>6/10/14</a:t>
             </a:fld>
             <a:endParaRPr lang="en-US"/>
           </a:p>
@@ -3220,7 +3220,7 @@
           <a:p>
             <a:fld id="{46E2107D-D319-5F4F-8A99-2F4ABC4ACCF5}" type="datetimeFigureOut">
               <a:rPr lang="en-US" smtClean="0"/>
-              <a:t>6/9/14</a:t>
+              <a:t>6/10/14</a:t>
             </a:fld>
             <a:endParaRPr lang="en-US"/>
           </a:p>
@@ -3768,7 +3768,7 @@
           <a:p>
             <a:fld id="{46E2107D-D319-5F4F-8A99-2F4ABC4ACCF5}" type="datetimeFigureOut">
               <a:rPr lang="en-US" smtClean="0"/>
-              <a:t>6/9/14</a:t>
+              <a:t>6/10/14</a:t>
             </a:fld>
             <a:endParaRPr lang="en-US"/>
           </a:p>
@@ -4126,7 +4126,7 @@
           <a:p>
             <a:fld id="{46E2107D-D319-5F4F-8A99-2F4ABC4ACCF5}" type="datetimeFigureOut">
               <a:rPr lang="en-US" smtClean="0"/>
-              <a:t>6/9/14</a:t>
+              <a:t>6/10/14</a:t>
             </a:fld>
             <a:endParaRPr lang="en-US"/>
           </a:p>
@@ -4341,7 +4341,7 @@
           <a:p>
             <a:fld id="{46E2107D-D319-5F4F-8A99-2F4ABC4ACCF5}" type="datetimeFigureOut">
               <a:rPr lang="en-US" smtClean="0"/>
-              <a:t>6/9/14</a:t>
+              <a:t>6/10/14</a:t>
             </a:fld>
             <a:endParaRPr lang="en-US"/>
           </a:p>
@@ -4648,7 +4648,7 @@
           <a:p>
             <a:fld id="{46E2107D-D319-5F4F-8A99-2F4ABC4ACCF5}" type="datetimeFigureOut">
               <a:rPr lang="en-US" smtClean="0"/>
-              <a:t>6/9/14</a:t>
+              <a:t>6/10/14</a:t>
             </a:fld>
             <a:endParaRPr lang="en-US"/>
           </a:p>
@@ -4904,7 +4904,7 @@
           <a:p>
             <a:fld id="{46E2107D-D319-5F4F-8A99-2F4ABC4ACCF5}" type="datetimeFigureOut">
               <a:rPr lang="en-US" smtClean="0"/>
-              <a:t>6/9/14</a:t>
+              <a:t>6/10/14</a:t>
             </a:fld>
             <a:endParaRPr lang="en-US"/>
           </a:p>
@@ -5293,7 +5293,7 @@
           <a:p>
             <a:fld id="{46E2107D-D319-5F4F-8A99-2F4ABC4ACCF5}" type="datetimeFigureOut">
               <a:rPr lang="en-US" smtClean="0"/>
-              <a:t>6/9/14</a:t>
+              <a:t>6/10/14</a:t>
             </a:fld>
             <a:endParaRPr lang="en-US"/>
           </a:p>
@@ -5882,7 +5882,7 @@
           <a:p>
             <a:fld id="{46E2107D-D319-5F4F-8A99-2F4ABC4ACCF5}" type="datetimeFigureOut">
               <a:rPr lang="en-US" smtClean="0"/>
-              <a:t>6/9/14</a:t>
+              <a:t>6/10/14</a:t>
             </a:fld>
             <a:endParaRPr lang="en-US"/>
           </a:p>
@@ -6397,7 +6397,7 @@
           <a:p>
             <a:fld id="{46E2107D-D319-5F4F-8A99-2F4ABC4ACCF5}" type="datetimeFigureOut">
               <a:rPr lang="en-US" smtClean="0"/>
-              <a:t>6/9/14</a:t>
+              <a:t>6/10/14</a:t>
             </a:fld>
             <a:endParaRPr lang="en-US"/>
           </a:p>
@@ -6770,7 +6770,7 @@
           <a:p>
             <a:fld id="{46E2107D-D319-5F4F-8A99-2F4ABC4ACCF5}" type="datetimeFigureOut">
               <a:rPr lang="en-US" smtClean="0"/>
-              <a:t>6/9/14</a:t>
+              <a:t>6/10/14</a:t>
             </a:fld>
             <a:endParaRPr lang="en-US"/>
           </a:p>
@@ -7169,7 +7169,7 @@
           <a:p>
             <a:fld id="{46E2107D-D319-5F4F-8A99-2F4ABC4ACCF5}" type="datetimeFigureOut">
               <a:rPr lang="en-US" smtClean="0"/>
-              <a:t>6/9/14</a:t>
+              <a:t>6/10/14</a:t>
             </a:fld>
             <a:endParaRPr lang="en-US"/>
           </a:p>
@@ -7589,7 +7589,7 @@
           <a:p>
             <a:fld id="{46E2107D-D319-5F4F-8A99-2F4ABC4ACCF5}" type="datetimeFigureOut">
               <a:rPr lang="en-US" smtClean="0"/>
-              <a:t>6/9/14</a:t>
+              <a:t>6/10/14</a:t>
             </a:fld>
             <a:endParaRPr lang="en-US"/>
           </a:p>
@@ -7972,7 +7972,7 @@
           <a:p>
             <a:fld id="{46E2107D-D319-5F4F-8A99-2F4ABC4ACCF5}" type="datetimeFigureOut">
               <a:rPr lang="en-US" smtClean="0"/>
-              <a:t>6/9/14</a:t>
+              <a:t>6/10/14</a:t>
             </a:fld>
             <a:endParaRPr lang="en-US"/>
           </a:p>
@@ -8886,7 +8886,15 @@
           <a:p>
             <a:r>
               <a:rPr lang="en-US" sz="2800" dirty="0" smtClean="0"/>
-              <a:t>For members of the DM community who want to experiment with the lighting in the NUDM tent the Tent Lights app is a web based virtual reality that allows users to control the lighting scheme for a virtual NUDM tent. Unlike other solutions it is browser based and doesn’t require additional software.</a:t>
+              <a:t>For members of the DM community who want to experiment with lighting design the Tent Lights app is a web based virtual </a:t>
+            </a:r>
+            <a:r>
+              <a:rPr lang="en-US" sz="2800" smtClean="0"/>
+              <a:t>reality app </a:t>
+            </a:r>
+            <a:r>
+              <a:rPr lang="en-US" sz="2800" dirty="0" smtClean="0"/>
+              <a:t>that allows users to control the lighting scheme for a virtual NUDM tent. Unlike other solutions it is browser based and doesn’t require additional software.</a:t>
             </a:r>
             <a:endParaRPr lang="en-US" sz="2800" dirty="0"/>
           </a:p>

</xml_diff>